<commit_message>
Documento Tecnico y Presentacion
</commit_message>
<xml_diff>
--- a/Presentacion_Proyecto.pptx
+++ b/Presentacion_Proyecto.pptx
@@ -9,13 +9,14 @@
     <p:sldId id="257" r:id="rId3"/>
     <p:sldId id="258" r:id="rId4"/>
     <p:sldId id="259" r:id="rId5"/>
-    <p:sldId id="261" r:id="rId6"/>
-    <p:sldId id="262" r:id="rId7"/>
-    <p:sldId id="260" r:id="rId8"/>
-    <p:sldId id="263" r:id="rId9"/>
-    <p:sldId id="266" r:id="rId10"/>
-    <p:sldId id="265" r:id="rId11"/>
-    <p:sldId id="264" r:id="rId12"/>
+    <p:sldId id="267" r:id="rId6"/>
+    <p:sldId id="261" r:id="rId7"/>
+    <p:sldId id="262" r:id="rId8"/>
+    <p:sldId id="260" r:id="rId9"/>
+    <p:sldId id="263" r:id="rId10"/>
+    <p:sldId id="266" r:id="rId11"/>
+    <p:sldId id="265" r:id="rId12"/>
+    <p:sldId id="264" r:id="rId13"/>
   </p:sldIdLst>
   <p:sldSz cx="12192000" cy="6858000"/>
   <p:notesSz cx="6858000" cy="9144000"/>
@@ -114,6 +115,11 @@
       </a:defRPr>
     </a:lvl9pPr>
   </p:defaultTextStyle>
+  <p:extLst>
+    <p:ext uri="{EFAFB233-063F-42B5-8137-9DF3F51BA10A}">
+      <p15:sldGuideLst xmlns:p15="http://schemas.microsoft.com/office/powerpoint/2012/main"/>
+    </p:ext>
+  </p:extLst>
 </p:presentation>
 </file>
 
@@ -7916,7 +7922,7 @@
           <a:p>
             <a:r>
               <a:rPr lang="es-EC" sz="4400" b="1" dirty="0" smtClean="0"/>
-              <a:t>Sección 2.</a:t>
+              <a:t>Sección 1.</a:t>
             </a:r>
             <a:endParaRPr lang="es-EC" sz="2000" dirty="0"/>
           </a:p>
@@ -7924,21 +7930,22 @@
       </p:sp>
       <p:pic>
         <p:nvPicPr>
-          <p:cNvPr id="4" name="Imagen 3"/>
+          <p:cNvPr id="3" name="Imagen 2"/>
           <p:cNvPicPr>
             <a:picLocks noChangeAspect="1"/>
           </p:cNvPicPr>
           <p:nvPr/>
         </p:nvPicPr>
-        <p:blipFill rotWithShape="1">
+        <p:blipFill>
           <a:blip r:embed="rId2"/>
-          <a:srcRect r="50133"/>
-          <a:stretch/>
+          <a:stretch>
+            <a:fillRect/>
+          </a:stretch>
         </p:blipFill>
         <p:spPr>
           <a:xfrm>
-            <a:off x="765219" y="761464"/>
-            <a:ext cx="6459828" cy="3429000"/>
+            <a:off x="870800" y="859593"/>
+            <a:ext cx="6457950" cy="3352800"/>
           </a:xfrm>
           <a:prstGeom prst="rect">
             <a:avLst/>
@@ -7947,21 +7954,22 @@
       </p:pic>
       <p:pic>
         <p:nvPicPr>
-          <p:cNvPr id="5" name="Imagen 4"/>
+          <p:cNvPr id="6" name="Imagen 5"/>
           <p:cNvPicPr>
             <a:picLocks noChangeAspect="1"/>
           </p:cNvPicPr>
           <p:nvPr/>
         </p:nvPicPr>
-        <p:blipFill rotWithShape="1">
-          <a:blip r:embed="rId2"/>
-          <a:srcRect l="49470"/>
-          <a:stretch/>
+        <p:blipFill>
+          <a:blip r:embed="rId3"/>
+          <a:stretch>
+            <a:fillRect/>
+          </a:stretch>
         </p:blipFill>
         <p:spPr>
           <a:xfrm>
-            <a:off x="5466009" y="3288944"/>
-            <a:ext cx="6545687" cy="3429000"/>
+            <a:off x="5676900" y="3413975"/>
+            <a:ext cx="6515100" cy="3352800"/>
           </a:xfrm>
           <a:prstGeom prst="rect">
             <a:avLst/>
@@ -7971,7 +7979,7 @@
     </p:spTree>
     <p:extLst>
       <p:ext uri="{BB962C8B-B14F-4D97-AF65-F5344CB8AC3E}">
-        <p14:creationId xmlns:p14="http://schemas.microsoft.com/office/powerpoint/2010/main" val="2790345699"/>
+        <p14:creationId xmlns:p14="http://schemas.microsoft.com/office/powerpoint/2010/main" val="2642110677"/>
       </p:ext>
     </p:extLst>
   </p:cSld>
@@ -8013,6 +8021,119 @@
         </p:nvSpPr>
         <p:spPr>
           <a:xfrm>
+            <a:off x="1627030" y="90152"/>
+            <a:ext cx="6413679" cy="769441"/>
+          </a:xfrm>
+          <a:prstGeom prst="rect">
+            <a:avLst/>
+          </a:prstGeom>
+          <a:noFill/>
+        </p:spPr>
+        <p:txBody>
+          <a:bodyPr wrap="square" rtlCol="0">
+            <a:spAutoFit/>
+          </a:bodyPr>
+          <a:lstStyle/>
+          <a:p>
+            <a:r>
+              <a:rPr lang="es-EC" sz="4400" b="1" dirty="0" smtClean="0"/>
+              <a:t>Sección 2.</a:t>
+            </a:r>
+            <a:endParaRPr lang="es-EC" sz="2000" dirty="0"/>
+          </a:p>
+        </p:txBody>
+      </p:sp>
+      <p:pic>
+        <p:nvPicPr>
+          <p:cNvPr id="4" name="Imagen 3"/>
+          <p:cNvPicPr>
+            <a:picLocks noChangeAspect="1"/>
+          </p:cNvPicPr>
+          <p:nvPr/>
+        </p:nvPicPr>
+        <p:blipFill rotWithShape="1">
+          <a:blip r:embed="rId2"/>
+          <a:srcRect r="50133"/>
+          <a:stretch/>
+        </p:blipFill>
+        <p:spPr>
+          <a:xfrm>
+            <a:off x="765219" y="761464"/>
+            <a:ext cx="6459828" cy="3429000"/>
+          </a:xfrm>
+          <a:prstGeom prst="rect">
+            <a:avLst/>
+          </a:prstGeom>
+        </p:spPr>
+      </p:pic>
+      <p:pic>
+        <p:nvPicPr>
+          <p:cNvPr id="5" name="Imagen 4"/>
+          <p:cNvPicPr>
+            <a:picLocks noChangeAspect="1"/>
+          </p:cNvPicPr>
+          <p:nvPr/>
+        </p:nvPicPr>
+        <p:blipFill rotWithShape="1">
+          <a:blip r:embed="rId2"/>
+          <a:srcRect l="49470"/>
+          <a:stretch/>
+        </p:blipFill>
+        <p:spPr>
+          <a:xfrm>
+            <a:off x="5466009" y="3288944"/>
+            <a:ext cx="6545687" cy="3429000"/>
+          </a:xfrm>
+          <a:prstGeom prst="rect">
+            <a:avLst/>
+          </a:prstGeom>
+        </p:spPr>
+      </p:pic>
+    </p:spTree>
+    <p:extLst>
+      <p:ext uri="{BB962C8B-B14F-4D97-AF65-F5344CB8AC3E}">
+        <p14:creationId xmlns:p14="http://schemas.microsoft.com/office/powerpoint/2010/main" val="2790345699"/>
+      </p:ext>
+    </p:extLst>
+  </p:cSld>
+  <p:clrMapOvr>
+    <a:masterClrMapping/>
+  </p:clrMapOvr>
+  <p:timing>
+    <p:tnLst>
+      <p:par>
+        <p:cTn id="1" dur="indefinite" restart="never" nodeType="tmRoot"/>
+      </p:par>
+    </p:tnLst>
+  </p:timing>
+</p:sld>
+</file>
+
+<file path=ppt/slides/slide12.xml><?xml version="1.0" encoding="utf-8"?>
+<p:sld xmlns:a="http://schemas.openxmlformats.org/drawingml/2006/main" xmlns:r="http://schemas.openxmlformats.org/officeDocument/2006/relationships" xmlns:p="http://schemas.openxmlformats.org/presentationml/2006/main">
+  <p:cSld>
+    <p:spTree>
+      <p:nvGrpSpPr>
+        <p:cNvPr id="1" name=""/>
+        <p:cNvGrpSpPr/>
+        <p:nvPr/>
+      </p:nvGrpSpPr>
+      <p:grpSpPr>
+        <a:xfrm>
+          <a:off x="0" y="0"/>
+          <a:ext cx="0" cy="0"/>
+          <a:chOff x="0" y="0"/>
+          <a:chExt cx="0" cy="0"/>
+        </a:xfrm>
+      </p:grpSpPr>
+      <p:sp>
+        <p:nvSpPr>
+          <p:cNvPr id="2" name="CuadroTexto 1"/>
+          <p:cNvSpPr txBox="1"/>
+          <p:nvPr/>
+        </p:nvSpPr>
+        <p:spPr>
+          <a:xfrm>
             <a:off x="1627030" y="0"/>
             <a:ext cx="6413679" cy="769441"/>
           </a:xfrm>
@@ -8059,6 +8180,46 @@
           </a:prstGeom>
         </p:spPr>
       </p:pic>
+      <p:sp>
+        <p:nvSpPr>
+          <p:cNvPr id="4" name="Rectángulo 3"/>
+          <p:cNvSpPr/>
+          <p:nvPr/>
+        </p:nvSpPr>
+        <p:spPr>
+          <a:xfrm>
+            <a:off x="9491730" y="2165678"/>
+            <a:ext cx="1854558" cy="1477328"/>
+          </a:xfrm>
+          <a:prstGeom prst="rect">
+            <a:avLst/>
+          </a:prstGeom>
+        </p:spPr>
+        <p:txBody>
+          <a:bodyPr wrap="square">
+            <a:spAutoFit/>
+          </a:bodyPr>
+          <a:lstStyle/>
+          <a:p>
+            <a:r>
+              <a:rPr lang="es-EC" dirty="0">
+                <a:hlinkClick r:id="rId3"/>
+              </a:rPr>
+              <a:t>https://</a:t>
+            </a:r>
+            <a:r>
+              <a:rPr lang="es-EC" dirty="0" smtClean="0">
+                <a:hlinkClick r:id="rId3"/>
+              </a:rPr>
+              <a:t>github.com/GeovannyMunoz/proyectobddmulti1</a:t>
+            </a:r>
+            <a:endParaRPr lang="es-EC" dirty="0" smtClean="0"/>
+          </a:p>
+          <a:p>
+            <a:endParaRPr lang="es-EC" dirty="0"/>
+          </a:p>
+        </p:txBody>
+      </p:sp>
     </p:spTree>
     <p:extLst>
       <p:ext uri="{BB962C8B-B14F-4D97-AF65-F5344CB8AC3E}">
@@ -8474,8 +8635,8 @@
         </p:blipFill>
         <p:spPr>
           <a:xfrm>
-            <a:off x="3648075" y="109537"/>
-            <a:ext cx="4895850" cy="6638925"/>
+            <a:off x="1378039" y="193184"/>
+            <a:ext cx="9852338" cy="6503830"/>
           </a:xfrm>
           <a:prstGeom prst="rect">
             <a:avLst/>
@@ -8485,20 +8646,13 @@
     </p:spTree>
     <p:extLst>
       <p:ext uri="{BB962C8B-B14F-4D97-AF65-F5344CB8AC3E}">
-        <p14:creationId xmlns:p14="http://schemas.microsoft.com/office/powerpoint/2010/main" val="1128993674"/>
+        <p14:creationId xmlns:p14="http://schemas.microsoft.com/office/powerpoint/2010/main" val="3236728573"/>
       </p:ext>
     </p:extLst>
   </p:cSld>
   <p:clrMapOvr>
     <a:masterClrMapping/>
   </p:clrMapOvr>
-  <p:timing>
-    <p:tnLst>
-      <p:par>
-        <p:cTn id="1" dur="indefinite" restart="never" nodeType="tmRoot"/>
-      </p:par>
-    </p:tnLst>
-  </p:timing>
 </p:sld>
 </file>
 
@@ -8533,8 +8687,8 @@
         </p:blipFill>
         <p:spPr>
           <a:xfrm>
-            <a:off x="3667125" y="104775"/>
-            <a:ext cx="4857750" cy="6648450"/>
+            <a:off x="3648075" y="109537"/>
+            <a:ext cx="4895850" cy="6638925"/>
           </a:xfrm>
           <a:prstGeom prst="rect">
             <a:avLst/>
@@ -8544,7 +8698,7 @@
     </p:spTree>
     <p:extLst>
       <p:ext uri="{BB962C8B-B14F-4D97-AF65-F5344CB8AC3E}">
-        <p14:creationId xmlns:p14="http://schemas.microsoft.com/office/powerpoint/2010/main" val="1838510611"/>
+        <p14:creationId xmlns:p14="http://schemas.microsoft.com/office/powerpoint/2010/main" val="1128993674"/>
       </p:ext>
     </p:extLst>
   </p:cSld>
@@ -8581,9 +8735,7 @@
       <p:pic>
         <p:nvPicPr>
           <p:cNvPr id="2" name="Imagen 1"/>
-          <p:cNvPicPr>
-            <a:picLocks noChangeAspect="1"/>
-          </p:cNvPicPr>
+          <p:cNvPicPr/>
           <p:nvPr/>
         </p:nvPicPr>
         <p:blipFill>
@@ -8594,92 +8746,8 @@
         </p:blipFill>
         <p:spPr>
           <a:xfrm>
-            <a:off x="592429" y="1606639"/>
-            <a:ext cx="11485166" cy="1432775"/>
-          </a:xfrm>
-          <a:prstGeom prst="rect">
-            <a:avLst/>
-          </a:prstGeom>
-        </p:spPr>
-      </p:pic>
-      <p:sp>
-        <p:nvSpPr>
-          <p:cNvPr id="3" name="CuadroTexto 2"/>
-          <p:cNvSpPr txBox="1"/>
-          <p:nvPr/>
-        </p:nvSpPr>
-        <p:spPr>
-          <a:xfrm>
-            <a:off x="3224010" y="515155"/>
-            <a:ext cx="6413679" cy="769441"/>
-          </a:xfrm>
-          <a:prstGeom prst="rect">
-            <a:avLst/>
-          </a:prstGeom>
-          <a:noFill/>
-        </p:spPr>
-        <p:txBody>
-          <a:bodyPr wrap="square" rtlCol="0">
-            <a:spAutoFit/>
-          </a:bodyPr>
-          <a:lstStyle/>
-          <a:p>
-            <a:r>
-              <a:rPr lang="es-EC" sz="4400" b="1" dirty="0" smtClean="0"/>
-              <a:t>Base No-SQL (tweets)</a:t>
-            </a:r>
-            <a:endParaRPr lang="es-EC" sz="2000" dirty="0"/>
-          </a:p>
-        </p:txBody>
-      </p:sp>
-      <p:sp>
-        <p:nvSpPr>
-          <p:cNvPr id="4" name="CuadroTexto 3"/>
-          <p:cNvSpPr txBox="1"/>
-          <p:nvPr/>
-        </p:nvSpPr>
-        <p:spPr>
-          <a:xfrm>
-            <a:off x="2987896" y="3541761"/>
-            <a:ext cx="6885905" cy="769441"/>
-          </a:xfrm>
-          <a:prstGeom prst="rect">
-            <a:avLst/>
-          </a:prstGeom>
-          <a:noFill/>
-        </p:spPr>
-        <p:txBody>
-          <a:bodyPr wrap="square" rtlCol="0">
-            <a:spAutoFit/>
-          </a:bodyPr>
-          <a:lstStyle/>
-          <a:p>
-            <a:r>
-              <a:rPr lang="es-EC" sz="4400" b="1" dirty="0" smtClean="0"/>
-              <a:t>Base unificada (tweets)</a:t>
-            </a:r>
-            <a:endParaRPr lang="es-EC" sz="2000" dirty="0"/>
-          </a:p>
-        </p:txBody>
-      </p:sp>
-      <p:pic>
-        <p:nvPicPr>
-          <p:cNvPr id="5" name="Imagen 4"/>
-          <p:cNvPicPr>
-            <a:picLocks noChangeAspect="1"/>
-          </p:cNvPicPr>
-          <p:nvPr/>
-        </p:nvPicPr>
-        <p:blipFill>
-          <a:blip r:embed="rId3"/>
-          <a:stretch>
-            <a:fillRect/>
-          </a:stretch>
-        </p:blipFill>
-        <p:spPr>
-          <a:xfrm>
-            <a:off x="695659" y="4813549"/>
-            <a:ext cx="10620375" cy="676275"/>
+            <a:off x="3667125" y="104775"/>
+            <a:ext cx="4857750" cy="6648450"/>
           </a:xfrm>
           <a:prstGeom prst="rect">
             <a:avLst/>
@@ -8689,7 +8757,7 @@
     </p:spTree>
     <p:extLst>
       <p:ext uri="{BB962C8B-B14F-4D97-AF65-F5344CB8AC3E}">
-        <p14:creationId xmlns:p14="http://schemas.microsoft.com/office/powerpoint/2010/main" val="4006458135"/>
+        <p14:creationId xmlns:p14="http://schemas.microsoft.com/office/powerpoint/2010/main" val="1838510611"/>
       </p:ext>
     </p:extLst>
   </p:cSld>
@@ -8723,16 +8791,40 @@
           <a:chExt cx="0" cy="0"/>
         </a:xfrm>
       </p:grpSpPr>
-      <p:sp>
-        <p:nvSpPr>
-          <p:cNvPr id="2" name="CuadroTexto 1"/>
+      <p:pic>
+        <p:nvPicPr>
+          <p:cNvPr id="2" name="Imagen 1"/>
+          <p:cNvPicPr>
+            <a:picLocks noChangeAspect="1"/>
+          </p:cNvPicPr>
+          <p:nvPr/>
+        </p:nvPicPr>
+        <p:blipFill>
+          <a:blip r:embed="rId2"/>
+          <a:stretch>
+            <a:fillRect/>
+          </a:stretch>
+        </p:blipFill>
+        <p:spPr>
+          <a:xfrm>
+            <a:off x="592429" y="1606639"/>
+            <a:ext cx="11485166" cy="1432775"/>
+          </a:xfrm>
+          <a:prstGeom prst="rect">
+            <a:avLst/>
+          </a:prstGeom>
+        </p:spPr>
+      </p:pic>
+      <p:sp>
+        <p:nvSpPr>
+          <p:cNvPr id="3" name="CuadroTexto 2"/>
           <p:cNvSpPr txBox="1"/>
           <p:nvPr/>
         </p:nvSpPr>
         <p:spPr>
           <a:xfrm>
-            <a:off x="2653048" y="2498501"/>
-            <a:ext cx="8010659" cy="1015663"/>
+            <a:off x="3224010" y="515155"/>
+            <a:ext cx="6413679" cy="769441"/>
           </a:xfrm>
           <a:prstGeom prst="rect">
             <a:avLst/>
@@ -8746,17 +8838,71 @@
           <a:lstStyle/>
           <a:p>
             <a:r>
-              <a:rPr lang="es-EC" sz="6000" dirty="0" smtClean="0"/>
-              <a:t>INTERFAZ PROYECTO</a:t>
-            </a:r>
-            <a:endParaRPr lang="es-EC" sz="6000" dirty="0"/>
-          </a:p>
-        </p:txBody>
-      </p:sp>
+              <a:rPr lang="es-EC" sz="4400" b="1" dirty="0" smtClean="0"/>
+              <a:t>Base No-SQL (tweets)</a:t>
+            </a:r>
+            <a:endParaRPr lang="es-EC" sz="2000" dirty="0"/>
+          </a:p>
+        </p:txBody>
+      </p:sp>
+      <p:sp>
+        <p:nvSpPr>
+          <p:cNvPr id="4" name="CuadroTexto 3"/>
+          <p:cNvSpPr txBox="1"/>
+          <p:nvPr/>
+        </p:nvSpPr>
+        <p:spPr>
+          <a:xfrm>
+            <a:off x="2987896" y="3541761"/>
+            <a:ext cx="6885905" cy="769441"/>
+          </a:xfrm>
+          <a:prstGeom prst="rect">
+            <a:avLst/>
+          </a:prstGeom>
+          <a:noFill/>
+        </p:spPr>
+        <p:txBody>
+          <a:bodyPr wrap="square" rtlCol="0">
+            <a:spAutoFit/>
+          </a:bodyPr>
+          <a:lstStyle/>
+          <a:p>
+            <a:r>
+              <a:rPr lang="es-EC" sz="4400" b="1" dirty="0" smtClean="0"/>
+              <a:t>Base unificada (tweets)</a:t>
+            </a:r>
+            <a:endParaRPr lang="es-EC" sz="2000" dirty="0"/>
+          </a:p>
+        </p:txBody>
+      </p:sp>
+      <p:pic>
+        <p:nvPicPr>
+          <p:cNvPr id="5" name="Imagen 4"/>
+          <p:cNvPicPr>
+            <a:picLocks noChangeAspect="1"/>
+          </p:cNvPicPr>
+          <p:nvPr/>
+        </p:nvPicPr>
+        <p:blipFill>
+          <a:blip r:embed="rId3"/>
+          <a:stretch>
+            <a:fillRect/>
+          </a:stretch>
+        </p:blipFill>
+        <p:spPr>
+          <a:xfrm>
+            <a:off x="695659" y="4813549"/>
+            <a:ext cx="10620375" cy="676275"/>
+          </a:xfrm>
+          <a:prstGeom prst="rect">
+            <a:avLst/>
+          </a:prstGeom>
+        </p:spPr>
+      </p:pic>
     </p:spTree>
     <p:extLst>
       <p:ext uri="{BB962C8B-B14F-4D97-AF65-F5344CB8AC3E}">
-        <p14:creationId xmlns:p14="http://schemas.microsoft.com/office/powerpoint/2010/main" val="152638393"/>
+        <p14:creationId xmlns:p14="http://schemas.microsoft.com/office/powerpoint/2010/main" val="4006458135"/>
       </p:ext>
     </p:extLst>
   </p:cSld>
@@ -8798,8 +8944,8 @@
         </p:nvSpPr>
         <p:spPr>
           <a:xfrm>
-            <a:off x="1627030" y="90152"/>
-            <a:ext cx="6413679" cy="769441"/>
+            <a:off x="2653048" y="2498501"/>
+            <a:ext cx="8010659" cy="1015663"/>
           </a:xfrm>
           <a:prstGeom prst="rect">
             <a:avLst/>
@@ -8813,65 +8959,17 @@
           <a:lstStyle/>
           <a:p>
             <a:r>
-              <a:rPr lang="es-EC" sz="4400" b="1" dirty="0" smtClean="0"/>
-              <a:t>Sección 1.</a:t>
-            </a:r>
-            <a:endParaRPr lang="es-EC" sz="2000" dirty="0"/>
-          </a:p>
-        </p:txBody>
-      </p:sp>
-      <p:pic>
-        <p:nvPicPr>
-          <p:cNvPr id="3" name="Imagen 2"/>
-          <p:cNvPicPr>
-            <a:picLocks noChangeAspect="1"/>
-          </p:cNvPicPr>
-          <p:nvPr/>
-        </p:nvPicPr>
-        <p:blipFill>
-          <a:blip r:embed="rId2"/>
-          <a:stretch>
-            <a:fillRect/>
-          </a:stretch>
-        </p:blipFill>
-        <p:spPr>
-          <a:xfrm>
-            <a:off x="870800" y="859593"/>
-            <a:ext cx="6457950" cy="3352800"/>
-          </a:xfrm>
-          <a:prstGeom prst="rect">
-            <a:avLst/>
-          </a:prstGeom>
-        </p:spPr>
-      </p:pic>
-      <p:pic>
-        <p:nvPicPr>
-          <p:cNvPr id="6" name="Imagen 5"/>
-          <p:cNvPicPr>
-            <a:picLocks noChangeAspect="1"/>
-          </p:cNvPicPr>
-          <p:nvPr/>
-        </p:nvPicPr>
-        <p:blipFill>
-          <a:blip r:embed="rId3"/>
-          <a:stretch>
-            <a:fillRect/>
-          </a:stretch>
-        </p:blipFill>
-        <p:spPr>
-          <a:xfrm>
-            <a:off x="5676900" y="3413975"/>
-            <a:ext cx="6515100" cy="3352800"/>
-          </a:xfrm>
-          <a:prstGeom prst="rect">
-            <a:avLst/>
-          </a:prstGeom>
-        </p:spPr>
-      </p:pic>
+              <a:rPr lang="es-EC" sz="6000" dirty="0" smtClean="0"/>
+              <a:t>INTERFAZ PROYECTO</a:t>
+            </a:r>
+            <a:endParaRPr lang="es-EC" sz="6000" dirty="0"/>
+          </a:p>
+        </p:txBody>
+      </p:sp>
     </p:spTree>
     <p:extLst>
       <p:ext uri="{BB962C8B-B14F-4D97-AF65-F5344CB8AC3E}">
-        <p14:creationId xmlns:p14="http://schemas.microsoft.com/office/powerpoint/2010/main" val="2642110677"/>
+        <p14:creationId xmlns:p14="http://schemas.microsoft.com/office/powerpoint/2010/main" val="152638393"/>
       </p:ext>
     </p:extLst>
   </p:cSld>

</xml_diff>